<commit_message>
improve weighted monte carlo description
</commit_message>
<xml_diff>
--- a/Paper/Bericht/Bilder/Random.pptx
+++ b/Paper/Bericht/Bilder/Random.pptx
@@ -6,6 +6,7 @@
   </p:sldMasterIdLst>
   <p:sldIdLst>
     <p:sldId id="256" r:id="rId2"/>
+    <p:sldId id="257" r:id="rId3"/>
   </p:sldIdLst>
   <p:sldSz cx="12192000" cy="6858000"/>
   <p:notesSz cx="6858000" cy="9144000"/>
@@ -104,6 +105,11 @@
       </a:defRPr>
     </a:lvl9pPr>
   </p:defaultTextStyle>
+  <p:extLst>
+    <p:ext uri="{EFAFB233-063F-42B5-8137-9DF3F51BA10A}">
+      <p15:sldGuideLst xmlns:p15="http://schemas.microsoft.com/office/powerpoint/2012/main"/>
+    </p:ext>
+  </p:extLst>
 </p:presentation>
 </file>
 
@@ -254,7 +260,7 @@
           <a:p>
             <a:fld id="{F0A4E7F0-3994-42AF-91BF-1969C452D125}" type="datetimeFigureOut">
               <a:rPr lang="de-DE" smtClean="0"/>
-              <a:t>16.03.2019</a:t>
+              <a:t>03.04.2019</a:t>
             </a:fld>
             <a:endParaRPr lang="de-DE"/>
           </a:p>
@@ -452,7 +458,7 @@
           <a:p>
             <a:fld id="{F0A4E7F0-3994-42AF-91BF-1969C452D125}" type="datetimeFigureOut">
               <a:rPr lang="de-DE" smtClean="0"/>
-              <a:t>16.03.2019</a:t>
+              <a:t>03.04.2019</a:t>
             </a:fld>
             <a:endParaRPr lang="de-DE"/>
           </a:p>
@@ -660,7 +666,7 @@
           <a:p>
             <a:fld id="{F0A4E7F0-3994-42AF-91BF-1969C452D125}" type="datetimeFigureOut">
               <a:rPr lang="de-DE" smtClean="0"/>
-              <a:t>16.03.2019</a:t>
+              <a:t>03.04.2019</a:t>
             </a:fld>
             <a:endParaRPr lang="de-DE"/>
           </a:p>
@@ -858,7 +864,7 @@
           <a:p>
             <a:fld id="{F0A4E7F0-3994-42AF-91BF-1969C452D125}" type="datetimeFigureOut">
               <a:rPr lang="de-DE" smtClean="0"/>
-              <a:t>16.03.2019</a:t>
+              <a:t>03.04.2019</a:t>
             </a:fld>
             <a:endParaRPr lang="de-DE"/>
           </a:p>
@@ -1133,7 +1139,7 @@
           <a:p>
             <a:fld id="{F0A4E7F0-3994-42AF-91BF-1969C452D125}" type="datetimeFigureOut">
               <a:rPr lang="de-DE" smtClean="0"/>
-              <a:t>16.03.2019</a:t>
+              <a:t>03.04.2019</a:t>
             </a:fld>
             <a:endParaRPr lang="de-DE"/>
           </a:p>
@@ -1398,7 +1404,7 @@
           <a:p>
             <a:fld id="{F0A4E7F0-3994-42AF-91BF-1969C452D125}" type="datetimeFigureOut">
               <a:rPr lang="de-DE" smtClean="0"/>
-              <a:t>16.03.2019</a:t>
+              <a:t>03.04.2019</a:t>
             </a:fld>
             <a:endParaRPr lang="de-DE"/>
           </a:p>
@@ -1810,7 +1816,7 @@
           <a:p>
             <a:fld id="{F0A4E7F0-3994-42AF-91BF-1969C452D125}" type="datetimeFigureOut">
               <a:rPr lang="de-DE" smtClean="0"/>
-              <a:t>16.03.2019</a:t>
+              <a:t>03.04.2019</a:t>
             </a:fld>
             <a:endParaRPr lang="de-DE"/>
           </a:p>
@@ -1951,7 +1957,7 @@
           <a:p>
             <a:fld id="{F0A4E7F0-3994-42AF-91BF-1969C452D125}" type="datetimeFigureOut">
               <a:rPr lang="de-DE" smtClean="0"/>
-              <a:t>16.03.2019</a:t>
+              <a:t>03.04.2019</a:t>
             </a:fld>
             <a:endParaRPr lang="de-DE"/>
           </a:p>
@@ -2064,7 +2070,7 @@
           <a:p>
             <a:fld id="{F0A4E7F0-3994-42AF-91BF-1969C452D125}" type="datetimeFigureOut">
               <a:rPr lang="de-DE" smtClean="0"/>
-              <a:t>16.03.2019</a:t>
+              <a:t>03.04.2019</a:t>
             </a:fld>
             <a:endParaRPr lang="de-DE"/>
           </a:p>
@@ -2375,7 +2381,7 @@
           <a:p>
             <a:fld id="{F0A4E7F0-3994-42AF-91BF-1969C452D125}" type="datetimeFigureOut">
               <a:rPr lang="de-DE" smtClean="0"/>
-              <a:t>16.03.2019</a:t>
+              <a:t>03.04.2019</a:t>
             </a:fld>
             <a:endParaRPr lang="de-DE"/>
           </a:p>
@@ -2663,7 +2669,7 @@
           <a:p>
             <a:fld id="{F0A4E7F0-3994-42AF-91BF-1969C452D125}" type="datetimeFigureOut">
               <a:rPr lang="de-DE" smtClean="0"/>
-              <a:t>16.03.2019</a:t>
+              <a:t>03.04.2019</a:t>
             </a:fld>
             <a:endParaRPr lang="de-DE"/>
           </a:p>
@@ -2904,7 +2910,7 @@
           <a:p>
             <a:fld id="{F0A4E7F0-3994-42AF-91BF-1969C452D125}" type="datetimeFigureOut">
               <a:rPr lang="de-DE" smtClean="0"/>
-              <a:t>16.03.2019</a:t>
+              <a:t>03.04.2019</a:t>
             </a:fld>
             <a:endParaRPr lang="de-DE"/>
           </a:p>
@@ -3861,6 +3867,864 @@
 </p:sld>
 </file>
 
+<file path=ppt/slides/slide2.xml><?xml version="1.0" encoding="utf-8"?>
+<p:sld xmlns:a="http://schemas.openxmlformats.org/drawingml/2006/main" xmlns:r="http://schemas.openxmlformats.org/officeDocument/2006/relationships" xmlns:p="http://schemas.openxmlformats.org/presentationml/2006/main">
+  <p:cSld>
+    <p:spTree>
+      <p:nvGrpSpPr>
+        <p:cNvPr id="1" name=""/>
+        <p:cNvGrpSpPr/>
+        <p:nvPr/>
+      </p:nvGrpSpPr>
+      <p:grpSpPr>
+        <a:xfrm>
+          <a:off x="0" y="0"/>
+          <a:ext cx="0" cy="0"/>
+          <a:chOff x="0" y="0"/>
+          <a:chExt cx="0" cy="0"/>
+        </a:xfrm>
+      </p:grpSpPr>
+      <p:sp>
+        <p:nvSpPr>
+          <p:cNvPr id="4" name="Textfeld 3">
+            <a:extLst>
+              <a:ext uri="{FF2B5EF4-FFF2-40B4-BE49-F238E27FC236}">
+                <a16:creationId xmlns:a16="http://schemas.microsoft.com/office/drawing/2014/main" id="{1983D5F2-D8D0-43F9-87DE-55BBC7D7825F}"/>
+              </a:ext>
+            </a:extLst>
+          </p:cNvPr>
+          <p:cNvSpPr txBox="1"/>
+          <p:nvPr/>
+        </p:nvSpPr>
+        <p:spPr>
+          <a:xfrm>
+            <a:off x="939684" y="1562654"/>
+            <a:ext cx="1620636" cy="369332"/>
+          </a:xfrm>
+          <a:prstGeom prst="rect">
+            <a:avLst/>
+          </a:prstGeom>
+          <a:noFill/>
+        </p:spPr>
+        <p:txBody>
+          <a:bodyPr wrap="none" rtlCol="0">
+            <a:spAutoFit/>
+          </a:bodyPr>
+          <a:lstStyle/>
+          <a:p>
+            <a:r>
+              <a:rPr lang="de-DE" dirty="0"/>
+              <a:t>Mögliche Züge:</a:t>
+            </a:r>
+          </a:p>
+        </p:txBody>
+      </p:sp>
+      <p:sp>
+        <p:nvSpPr>
+          <p:cNvPr id="5" name="Textfeld 4">
+            <a:extLst>
+              <a:ext uri="{FF2B5EF4-FFF2-40B4-BE49-F238E27FC236}">
+                <a16:creationId xmlns:a16="http://schemas.microsoft.com/office/drawing/2014/main" id="{7E4DC759-E413-46FC-BBFD-AED9D8A2E735}"/>
+              </a:ext>
+            </a:extLst>
+          </p:cNvPr>
+          <p:cNvSpPr txBox="1"/>
+          <p:nvPr/>
+        </p:nvSpPr>
+        <p:spPr>
+          <a:xfrm>
+            <a:off x="2560320" y="1147156"/>
+            <a:ext cx="1019831" cy="1200329"/>
+          </a:xfrm>
+          <a:prstGeom prst="rect">
+            <a:avLst/>
+          </a:prstGeom>
+          <a:noFill/>
+        </p:spPr>
+        <p:txBody>
+          <a:bodyPr wrap="none" rtlCol="0">
+            <a:spAutoFit/>
+          </a:bodyPr>
+          <a:lstStyle/>
+          <a:p>
+            <a:r>
+              <a:rPr lang="de-DE" dirty="0"/>
+              <a:t>c4:  40 %</a:t>
+            </a:r>
+          </a:p>
+          <a:p>
+            <a:r>
+              <a:rPr lang="de-DE" dirty="0"/>
+              <a:t>e6: 70 %</a:t>
+            </a:r>
+          </a:p>
+          <a:p>
+            <a:r>
+              <a:rPr lang="de-DE" dirty="0"/>
+              <a:t>f5:  55 %</a:t>
+            </a:r>
+          </a:p>
+          <a:p>
+            <a:r>
+              <a:rPr lang="de-DE" dirty="0"/>
+              <a:t>d3: 45 %</a:t>
+            </a:r>
+          </a:p>
+        </p:txBody>
+      </p:sp>
+      <p:sp>
+        <p:nvSpPr>
+          <p:cNvPr id="6" name="Rechteck 5">
+            <a:extLst>
+              <a:ext uri="{FF2B5EF4-FFF2-40B4-BE49-F238E27FC236}">
+                <a16:creationId xmlns:a16="http://schemas.microsoft.com/office/drawing/2014/main" id="{9FD431FD-2F25-4885-8C2A-F12561316871}"/>
+              </a:ext>
+            </a:extLst>
+          </p:cNvPr>
+          <p:cNvSpPr/>
+          <p:nvPr/>
+        </p:nvSpPr>
+        <p:spPr>
+          <a:xfrm>
+            <a:off x="4267200" y="2853000"/>
+            <a:ext cx="1313411" cy="576000"/>
+          </a:xfrm>
+          <a:prstGeom prst="rect">
+            <a:avLst/>
+          </a:prstGeom>
+        </p:spPr>
+        <p:style>
+          <a:lnRef idx="2">
+            <a:schemeClr val="accent1">
+              <a:shade val="50000"/>
+            </a:schemeClr>
+          </a:lnRef>
+          <a:fillRef idx="1">
+            <a:schemeClr val="accent1"/>
+          </a:fillRef>
+          <a:effectRef idx="0">
+            <a:schemeClr val="accent1"/>
+          </a:effectRef>
+          <a:fontRef idx="minor">
+            <a:schemeClr val="lt1"/>
+          </a:fontRef>
+        </p:style>
+        <p:txBody>
+          <a:bodyPr rtlCol="0" anchor="ctr"/>
+          <a:lstStyle/>
+          <a:p>
+            <a:pPr algn="ctr"/>
+            <a:r>
+              <a:rPr lang="de-DE" dirty="0"/>
+              <a:t>c4</a:t>
+            </a:r>
+          </a:p>
+        </p:txBody>
+      </p:sp>
+      <p:sp>
+        <p:nvSpPr>
+          <p:cNvPr id="7" name="Rechteck 6">
+            <a:extLst>
+              <a:ext uri="{FF2B5EF4-FFF2-40B4-BE49-F238E27FC236}">
+                <a16:creationId xmlns:a16="http://schemas.microsoft.com/office/drawing/2014/main" id="{ED0F4810-872F-4220-9A56-9B9703EE6C90}"/>
+              </a:ext>
+            </a:extLst>
+          </p:cNvPr>
+          <p:cNvSpPr/>
+          <p:nvPr/>
+        </p:nvSpPr>
+        <p:spPr>
+          <a:xfrm>
+            <a:off x="4267199" y="1845000"/>
+            <a:ext cx="1313411" cy="1008000"/>
+          </a:xfrm>
+          <a:prstGeom prst="rect">
+            <a:avLst/>
+          </a:prstGeom>
+          <a:solidFill>
+            <a:schemeClr val="accent2"/>
+          </a:solidFill>
+        </p:spPr>
+        <p:style>
+          <a:lnRef idx="2">
+            <a:schemeClr val="accent1">
+              <a:shade val="50000"/>
+            </a:schemeClr>
+          </a:lnRef>
+          <a:fillRef idx="1">
+            <a:schemeClr val="accent1"/>
+          </a:fillRef>
+          <a:effectRef idx="0">
+            <a:schemeClr val="accent1"/>
+          </a:effectRef>
+          <a:fontRef idx="minor">
+            <a:schemeClr val="lt1"/>
+          </a:fontRef>
+        </p:style>
+        <p:txBody>
+          <a:bodyPr rtlCol="0" anchor="ctr"/>
+          <a:lstStyle/>
+          <a:p>
+            <a:pPr algn="ctr"/>
+            <a:r>
+              <a:rPr lang="de-DE" dirty="0"/>
+              <a:t>e6</a:t>
+            </a:r>
+          </a:p>
+        </p:txBody>
+      </p:sp>
+      <p:sp>
+        <p:nvSpPr>
+          <p:cNvPr id="8" name="Rechteck 7">
+            <a:extLst>
+              <a:ext uri="{FF2B5EF4-FFF2-40B4-BE49-F238E27FC236}">
+                <a16:creationId xmlns:a16="http://schemas.microsoft.com/office/drawing/2014/main" id="{05F1E31C-7F31-4CEA-9EC0-DB01B26689D0}"/>
+              </a:ext>
+            </a:extLst>
+          </p:cNvPr>
+          <p:cNvSpPr/>
+          <p:nvPr/>
+        </p:nvSpPr>
+        <p:spPr>
+          <a:xfrm>
+            <a:off x="4267198" y="1053000"/>
+            <a:ext cx="1313411" cy="792000"/>
+          </a:xfrm>
+          <a:prstGeom prst="rect">
+            <a:avLst/>
+          </a:prstGeom>
+        </p:spPr>
+        <p:style>
+          <a:lnRef idx="2">
+            <a:schemeClr val="accent1">
+              <a:shade val="50000"/>
+            </a:schemeClr>
+          </a:lnRef>
+          <a:fillRef idx="1">
+            <a:schemeClr val="accent1"/>
+          </a:fillRef>
+          <a:effectRef idx="0">
+            <a:schemeClr val="accent1"/>
+          </a:effectRef>
+          <a:fontRef idx="minor">
+            <a:schemeClr val="lt1"/>
+          </a:fontRef>
+        </p:style>
+        <p:txBody>
+          <a:bodyPr rtlCol="0" anchor="ctr"/>
+          <a:lstStyle/>
+          <a:p>
+            <a:pPr algn="ctr"/>
+            <a:r>
+              <a:rPr lang="de-DE" dirty="0"/>
+              <a:t>f5</a:t>
+            </a:r>
+          </a:p>
+        </p:txBody>
+      </p:sp>
+      <p:sp>
+        <p:nvSpPr>
+          <p:cNvPr id="9" name="Rechteck 8">
+            <a:extLst>
+              <a:ext uri="{FF2B5EF4-FFF2-40B4-BE49-F238E27FC236}">
+                <a16:creationId xmlns:a16="http://schemas.microsoft.com/office/drawing/2014/main" id="{75A19D2B-43D9-4E0B-AB64-FDE7D20E707D}"/>
+              </a:ext>
+            </a:extLst>
+          </p:cNvPr>
+          <p:cNvSpPr/>
+          <p:nvPr/>
+        </p:nvSpPr>
+        <p:spPr>
+          <a:xfrm>
+            <a:off x="4267197" y="405000"/>
+            <a:ext cx="1313411" cy="648000"/>
+          </a:xfrm>
+          <a:prstGeom prst="rect">
+            <a:avLst/>
+          </a:prstGeom>
+          <a:solidFill>
+            <a:schemeClr val="accent2"/>
+          </a:solidFill>
+        </p:spPr>
+        <p:style>
+          <a:lnRef idx="2">
+            <a:schemeClr val="accent1">
+              <a:shade val="50000"/>
+            </a:schemeClr>
+          </a:lnRef>
+          <a:fillRef idx="1">
+            <a:schemeClr val="accent1"/>
+          </a:fillRef>
+          <a:effectRef idx="0">
+            <a:schemeClr val="accent1"/>
+          </a:effectRef>
+          <a:fontRef idx="minor">
+            <a:schemeClr val="lt1"/>
+          </a:fontRef>
+        </p:style>
+        <p:txBody>
+          <a:bodyPr rtlCol="0" anchor="ctr"/>
+          <a:lstStyle/>
+          <a:p>
+            <a:pPr algn="ctr"/>
+            <a:r>
+              <a:rPr lang="de-DE" dirty="0"/>
+              <a:t>d3</a:t>
+            </a:r>
+          </a:p>
+        </p:txBody>
+      </p:sp>
+      <p:sp>
+        <p:nvSpPr>
+          <p:cNvPr id="10" name="Geschweifte Klammer rechts 9">
+            <a:extLst>
+              <a:ext uri="{FF2B5EF4-FFF2-40B4-BE49-F238E27FC236}">
+                <a16:creationId xmlns:a16="http://schemas.microsoft.com/office/drawing/2014/main" id="{AF1F1828-6832-47AC-9BFE-33987788473E}"/>
+              </a:ext>
+            </a:extLst>
+          </p:cNvPr>
+          <p:cNvSpPr/>
+          <p:nvPr/>
+        </p:nvSpPr>
+        <p:spPr>
+          <a:xfrm>
+            <a:off x="5624945" y="405000"/>
+            <a:ext cx="543099" cy="3024000"/>
+          </a:xfrm>
+          <a:prstGeom prst="rightBrace">
+            <a:avLst/>
+          </a:prstGeom>
+        </p:spPr>
+        <p:style>
+          <a:lnRef idx="1">
+            <a:schemeClr val="accent1"/>
+          </a:lnRef>
+          <a:fillRef idx="0">
+            <a:schemeClr val="accent1"/>
+          </a:fillRef>
+          <a:effectRef idx="0">
+            <a:schemeClr val="accent1"/>
+          </a:effectRef>
+          <a:fontRef idx="minor">
+            <a:schemeClr val="tx1"/>
+          </a:fontRef>
+        </p:style>
+        <p:txBody>
+          <a:bodyPr rtlCol="0" anchor="ctr"/>
+          <a:lstStyle/>
+          <a:p>
+            <a:pPr algn="ctr"/>
+            <a:endParaRPr lang="de-DE"/>
+          </a:p>
+        </p:txBody>
+      </p:sp>
+      <p:sp>
+        <p:nvSpPr>
+          <p:cNvPr id="11" name="Textfeld 10">
+            <a:extLst>
+              <a:ext uri="{FF2B5EF4-FFF2-40B4-BE49-F238E27FC236}">
+                <a16:creationId xmlns:a16="http://schemas.microsoft.com/office/drawing/2014/main" id="{BDA2BC86-62CD-4126-BE1D-B2FBE56866E2}"/>
+              </a:ext>
+            </a:extLst>
+          </p:cNvPr>
+          <p:cNvSpPr txBox="1"/>
+          <p:nvPr/>
+        </p:nvSpPr>
+        <p:spPr>
+          <a:xfrm flipH="1">
+            <a:off x="6107080" y="1710169"/>
+            <a:ext cx="592975" cy="369332"/>
+          </a:xfrm>
+          <a:prstGeom prst="rect">
+            <a:avLst/>
+          </a:prstGeom>
+          <a:noFill/>
+        </p:spPr>
+        <p:txBody>
+          <a:bodyPr wrap="square" rtlCol="0">
+            <a:spAutoFit/>
+          </a:bodyPr>
+          <a:lstStyle/>
+          <a:p>
+            <a:r>
+              <a:rPr lang="de-DE" dirty="0"/>
+              <a:t>2,1</a:t>
+            </a:r>
+          </a:p>
+        </p:txBody>
+      </p:sp>
+      <p:sp>
+        <p:nvSpPr>
+          <p:cNvPr id="12" name="Textfeld 11">
+            <a:extLst>
+              <a:ext uri="{FF2B5EF4-FFF2-40B4-BE49-F238E27FC236}">
+                <a16:creationId xmlns:a16="http://schemas.microsoft.com/office/drawing/2014/main" id="{37F31612-106F-4F2E-930E-7E5F6D4F0EF9}"/>
+              </a:ext>
+            </a:extLst>
+          </p:cNvPr>
+          <p:cNvSpPr txBox="1"/>
+          <p:nvPr/>
+        </p:nvSpPr>
+        <p:spPr>
+          <a:xfrm>
+            <a:off x="7293492" y="1215199"/>
+            <a:ext cx="1756756" cy="369332"/>
+          </a:xfrm>
+          <a:prstGeom prst="rect">
+            <a:avLst/>
+          </a:prstGeom>
+          <a:noFill/>
+        </p:spPr>
+        <p:txBody>
+          <a:bodyPr wrap="square" rtlCol="0">
+            <a:spAutoFit/>
+          </a:bodyPr>
+          <a:lstStyle/>
+          <a:p>
+            <a:r>
+              <a:rPr lang="de-DE" dirty="0"/>
+              <a:t>Rand (2,1) = 1,3</a:t>
+            </a:r>
+          </a:p>
+        </p:txBody>
+      </p:sp>
+      <p:cxnSp>
+        <p:nvCxnSpPr>
+          <p:cNvPr id="15" name="Gerade Verbindung mit Pfeil 14">
+            <a:extLst>
+              <a:ext uri="{FF2B5EF4-FFF2-40B4-BE49-F238E27FC236}">
+                <a16:creationId xmlns:a16="http://schemas.microsoft.com/office/drawing/2014/main" id="{8A937812-CA33-4AAC-878C-257E2DC75F9D}"/>
+              </a:ext>
+            </a:extLst>
+          </p:cNvPr>
+          <p:cNvCxnSpPr>
+            <a:cxnSpLocks/>
+            <a:stCxn id="12" idx="1"/>
+          </p:cNvCxnSpPr>
+          <p:nvPr/>
+        </p:nvCxnSpPr>
+        <p:spPr>
+          <a:xfrm flipH="1" flipV="1">
+            <a:off x="5636028" y="1390993"/>
+            <a:ext cx="1657464" cy="8872"/>
+          </a:xfrm>
+          <a:prstGeom prst="straightConnector1">
+            <a:avLst/>
+          </a:prstGeom>
+          <a:ln>
+            <a:tailEnd type="triangle"/>
+          </a:ln>
+        </p:spPr>
+        <p:style>
+          <a:lnRef idx="1">
+            <a:schemeClr val="accent1"/>
+          </a:lnRef>
+          <a:fillRef idx="0">
+            <a:schemeClr val="accent1"/>
+          </a:fillRef>
+          <a:effectRef idx="0">
+            <a:schemeClr val="accent1"/>
+          </a:effectRef>
+          <a:fontRef idx="minor">
+            <a:schemeClr val="tx1"/>
+          </a:fontRef>
+        </p:style>
+      </p:cxnSp>
+      <p:sp>
+        <p:nvSpPr>
+          <p:cNvPr id="17" name="Pfeil: nach unten 16">
+            <a:extLst>
+              <a:ext uri="{FF2B5EF4-FFF2-40B4-BE49-F238E27FC236}">
+                <a16:creationId xmlns:a16="http://schemas.microsoft.com/office/drawing/2014/main" id="{15D8ED3B-18D7-445F-9E44-4317A95B7A47}"/>
+              </a:ext>
+            </a:extLst>
+          </p:cNvPr>
+          <p:cNvSpPr/>
+          <p:nvPr/>
+        </p:nvSpPr>
+        <p:spPr>
+          <a:xfrm>
+            <a:off x="7950198" y="1584531"/>
+            <a:ext cx="163026" cy="484097"/>
+          </a:xfrm>
+          <a:prstGeom prst="downArrow">
+            <a:avLst/>
+          </a:prstGeom>
+        </p:spPr>
+        <p:style>
+          <a:lnRef idx="2">
+            <a:schemeClr val="accent1">
+              <a:shade val="50000"/>
+            </a:schemeClr>
+          </a:lnRef>
+          <a:fillRef idx="1">
+            <a:schemeClr val="accent1"/>
+          </a:fillRef>
+          <a:effectRef idx="0">
+            <a:schemeClr val="accent1"/>
+          </a:effectRef>
+          <a:fontRef idx="minor">
+            <a:schemeClr val="lt1"/>
+          </a:fontRef>
+        </p:style>
+        <p:txBody>
+          <a:bodyPr rtlCol="0" anchor="ctr"/>
+          <a:lstStyle/>
+          <a:p>
+            <a:pPr algn="ctr"/>
+            <a:endParaRPr lang="de-DE"/>
+          </a:p>
+        </p:txBody>
+      </p:sp>
+      <p:sp>
+        <p:nvSpPr>
+          <p:cNvPr id="18" name="Textfeld 17">
+            <a:extLst>
+              <a:ext uri="{FF2B5EF4-FFF2-40B4-BE49-F238E27FC236}">
+                <a16:creationId xmlns:a16="http://schemas.microsoft.com/office/drawing/2014/main" id="{B4879CE1-2BCA-4356-9089-337D231C0A67}"/>
+              </a:ext>
+            </a:extLst>
+          </p:cNvPr>
+          <p:cNvSpPr txBox="1"/>
+          <p:nvPr/>
+        </p:nvSpPr>
+        <p:spPr>
+          <a:xfrm>
+            <a:off x="7845602" y="2068628"/>
+            <a:ext cx="372218" cy="369332"/>
+          </a:xfrm>
+          <a:prstGeom prst="rect">
+            <a:avLst/>
+          </a:prstGeom>
+          <a:noFill/>
+        </p:spPr>
+        <p:txBody>
+          <a:bodyPr wrap="none" rtlCol="0">
+            <a:spAutoFit/>
+          </a:bodyPr>
+          <a:lstStyle/>
+          <a:p>
+            <a:r>
+              <a:rPr lang="de-DE" dirty="0"/>
+              <a:t>f5</a:t>
+            </a:r>
+          </a:p>
+        </p:txBody>
+      </p:sp>
+      <p:sp>
+        <p:nvSpPr>
+          <p:cNvPr id="2" name="Ellipse 1">
+            <a:extLst>
+              <a:ext uri="{FF2B5EF4-FFF2-40B4-BE49-F238E27FC236}">
+                <a16:creationId xmlns:a16="http://schemas.microsoft.com/office/drawing/2014/main" id="{CEB19582-604C-46D6-8D0D-91A175F421F0}"/>
+              </a:ext>
+            </a:extLst>
+          </p:cNvPr>
+          <p:cNvSpPr/>
+          <p:nvPr/>
+        </p:nvSpPr>
+        <p:spPr>
+          <a:xfrm>
+            <a:off x="2746529" y="2290967"/>
+            <a:ext cx="445591" cy="445591"/>
+          </a:xfrm>
+          <a:prstGeom prst="ellipse">
+            <a:avLst/>
+          </a:prstGeom>
+        </p:spPr>
+        <p:style>
+          <a:lnRef idx="2">
+            <a:schemeClr val="accent1">
+              <a:shade val="50000"/>
+            </a:schemeClr>
+          </a:lnRef>
+          <a:fillRef idx="1">
+            <a:schemeClr val="accent1"/>
+          </a:fillRef>
+          <a:effectRef idx="0">
+            <a:schemeClr val="accent1"/>
+          </a:effectRef>
+          <a:fontRef idx="minor">
+            <a:schemeClr val="lt1"/>
+          </a:fontRef>
+        </p:style>
+        <p:txBody>
+          <a:bodyPr rtlCol="0" anchor="ctr"/>
+          <a:lstStyle/>
+          <a:p>
+            <a:pPr algn="ctr"/>
+            <a:r>
+              <a:rPr lang="de-DE" dirty="0"/>
+              <a:t>1</a:t>
+            </a:r>
+          </a:p>
+        </p:txBody>
+      </p:sp>
+      <p:sp>
+        <p:nvSpPr>
+          <p:cNvPr id="16" name="Ellipse 15">
+            <a:extLst>
+              <a:ext uri="{FF2B5EF4-FFF2-40B4-BE49-F238E27FC236}">
+                <a16:creationId xmlns:a16="http://schemas.microsoft.com/office/drawing/2014/main" id="{81D12372-CE0A-4C00-83DD-54BA1574E092}"/>
+              </a:ext>
+            </a:extLst>
+          </p:cNvPr>
+          <p:cNvSpPr/>
+          <p:nvPr/>
+        </p:nvSpPr>
+        <p:spPr>
+          <a:xfrm>
+            <a:off x="6004787" y="2102524"/>
+            <a:ext cx="445591" cy="445591"/>
+          </a:xfrm>
+          <a:prstGeom prst="ellipse">
+            <a:avLst/>
+          </a:prstGeom>
+        </p:spPr>
+        <p:style>
+          <a:lnRef idx="2">
+            <a:schemeClr val="accent1">
+              <a:shade val="50000"/>
+            </a:schemeClr>
+          </a:lnRef>
+          <a:fillRef idx="1">
+            <a:schemeClr val="accent1"/>
+          </a:fillRef>
+          <a:effectRef idx="0">
+            <a:schemeClr val="accent1"/>
+          </a:effectRef>
+          <a:fontRef idx="minor">
+            <a:schemeClr val="lt1"/>
+          </a:fontRef>
+        </p:style>
+        <p:txBody>
+          <a:bodyPr rtlCol="0" anchor="ctr"/>
+          <a:lstStyle/>
+          <a:p>
+            <a:pPr algn="ctr"/>
+            <a:r>
+              <a:rPr lang="de-DE" dirty="0"/>
+              <a:t>2</a:t>
+            </a:r>
+          </a:p>
+        </p:txBody>
+      </p:sp>
+      <p:sp>
+        <p:nvSpPr>
+          <p:cNvPr id="19" name="Ellipse 18">
+            <a:extLst>
+              <a:ext uri="{FF2B5EF4-FFF2-40B4-BE49-F238E27FC236}">
+                <a16:creationId xmlns:a16="http://schemas.microsoft.com/office/drawing/2014/main" id="{3507B622-C888-4280-8BC0-68EF50050B57}"/>
+              </a:ext>
+            </a:extLst>
+          </p:cNvPr>
+          <p:cNvSpPr/>
+          <p:nvPr/>
+        </p:nvSpPr>
+        <p:spPr>
+          <a:xfrm>
+            <a:off x="9072537" y="1177069"/>
+            <a:ext cx="445591" cy="445591"/>
+          </a:xfrm>
+          <a:prstGeom prst="ellipse">
+            <a:avLst/>
+          </a:prstGeom>
+        </p:spPr>
+        <p:style>
+          <a:lnRef idx="2">
+            <a:schemeClr val="accent1">
+              <a:shade val="50000"/>
+            </a:schemeClr>
+          </a:lnRef>
+          <a:fillRef idx="1">
+            <a:schemeClr val="accent1"/>
+          </a:fillRef>
+          <a:effectRef idx="0">
+            <a:schemeClr val="accent1"/>
+          </a:effectRef>
+          <a:fontRef idx="minor">
+            <a:schemeClr val="lt1"/>
+          </a:fontRef>
+        </p:style>
+        <p:txBody>
+          <a:bodyPr rtlCol="0" anchor="ctr"/>
+          <a:lstStyle/>
+          <a:p>
+            <a:pPr algn="ctr"/>
+            <a:r>
+              <a:rPr lang="de-DE" dirty="0"/>
+              <a:t>3</a:t>
+            </a:r>
+          </a:p>
+        </p:txBody>
+      </p:sp>
+      <p:sp>
+        <p:nvSpPr>
+          <p:cNvPr id="20" name="Ellipse 19">
+            <a:extLst>
+              <a:ext uri="{FF2B5EF4-FFF2-40B4-BE49-F238E27FC236}">
+                <a16:creationId xmlns:a16="http://schemas.microsoft.com/office/drawing/2014/main" id="{103793C4-0CA9-4543-A07E-F24E0CCC6348}"/>
+              </a:ext>
+            </a:extLst>
+          </p:cNvPr>
+          <p:cNvSpPr/>
+          <p:nvPr/>
+        </p:nvSpPr>
+        <p:spPr>
+          <a:xfrm>
+            <a:off x="8285578" y="2102604"/>
+            <a:ext cx="445591" cy="445591"/>
+          </a:xfrm>
+          <a:prstGeom prst="ellipse">
+            <a:avLst/>
+          </a:prstGeom>
+        </p:spPr>
+        <p:style>
+          <a:lnRef idx="2">
+            <a:schemeClr val="accent1">
+              <a:shade val="50000"/>
+            </a:schemeClr>
+          </a:lnRef>
+          <a:fillRef idx="1">
+            <a:schemeClr val="accent1"/>
+          </a:fillRef>
+          <a:effectRef idx="0">
+            <a:schemeClr val="accent1"/>
+          </a:effectRef>
+          <a:fontRef idx="minor">
+            <a:schemeClr val="lt1"/>
+          </a:fontRef>
+        </p:style>
+        <p:txBody>
+          <a:bodyPr rtlCol="0" anchor="ctr"/>
+          <a:lstStyle/>
+          <a:p>
+            <a:pPr algn="ctr"/>
+            <a:r>
+              <a:rPr lang="de-DE" dirty="0"/>
+              <a:t>4</a:t>
+            </a:r>
+          </a:p>
+        </p:txBody>
+      </p:sp>
+      <p:sp>
+        <p:nvSpPr>
+          <p:cNvPr id="21" name="Textfeld 20">
+            <a:extLst>
+              <a:ext uri="{FF2B5EF4-FFF2-40B4-BE49-F238E27FC236}">
+                <a16:creationId xmlns:a16="http://schemas.microsoft.com/office/drawing/2014/main" id="{8F1D1B85-2B42-458A-9473-A55ED8E6311B}"/>
+              </a:ext>
+            </a:extLst>
+          </p:cNvPr>
+          <p:cNvSpPr txBox="1"/>
+          <p:nvPr/>
+        </p:nvSpPr>
+        <p:spPr>
+          <a:xfrm flipH="1">
+            <a:off x="3890053" y="3141000"/>
+            <a:ext cx="322794" cy="369332"/>
+          </a:xfrm>
+          <a:prstGeom prst="rect">
+            <a:avLst/>
+          </a:prstGeom>
+          <a:noFill/>
+        </p:spPr>
+        <p:txBody>
+          <a:bodyPr wrap="square" rtlCol="0">
+            <a:spAutoFit/>
+          </a:bodyPr>
+          <a:lstStyle/>
+          <a:p>
+            <a:r>
+              <a:rPr lang="de-DE" dirty="0"/>
+              <a:t>0</a:t>
+            </a:r>
+          </a:p>
+        </p:txBody>
+      </p:sp>
+      <p:sp>
+        <p:nvSpPr>
+          <p:cNvPr id="22" name="Textfeld 21">
+            <a:extLst>
+              <a:ext uri="{FF2B5EF4-FFF2-40B4-BE49-F238E27FC236}">
+                <a16:creationId xmlns:a16="http://schemas.microsoft.com/office/drawing/2014/main" id="{BBEE13F5-DBDE-4305-9F7D-DA0D58291E48}"/>
+              </a:ext>
+            </a:extLst>
+          </p:cNvPr>
+          <p:cNvSpPr txBox="1"/>
+          <p:nvPr/>
+        </p:nvSpPr>
+        <p:spPr>
+          <a:xfrm flipH="1">
+            <a:off x="3798914" y="232093"/>
+            <a:ext cx="592975" cy="369332"/>
+          </a:xfrm>
+          <a:prstGeom prst="rect">
+            <a:avLst/>
+          </a:prstGeom>
+          <a:noFill/>
+        </p:spPr>
+        <p:txBody>
+          <a:bodyPr wrap="square" rtlCol="0">
+            <a:spAutoFit/>
+          </a:bodyPr>
+          <a:lstStyle/>
+          <a:p>
+            <a:r>
+              <a:rPr lang="de-DE" dirty="0"/>
+              <a:t>2,1</a:t>
+            </a:r>
+          </a:p>
+        </p:txBody>
+      </p:sp>
+      <p:sp>
+        <p:nvSpPr>
+          <p:cNvPr id="23" name="Textfeld 22">
+            <a:extLst>
+              <a:ext uri="{FF2B5EF4-FFF2-40B4-BE49-F238E27FC236}">
+                <a16:creationId xmlns:a16="http://schemas.microsoft.com/office/drawing/2014/main" id="{E66190DE-C0FA-427E-B28A-DE4B6ADA14D9}"/>
+              </a:ext>
+            </a:extLst>
+          </p:cNvPr>
+          <p:cNvSpPr txBox="1"/>
+          <p:nvPr/>
+        </p:nvSpPr>
+        <p:spPr>
+          <a:xfrm flipH="1">
+            <a:off x="3890053" y="1664751"/>
+            <a:ext cx="322795" cy="369332"/>
+          </a:xfrm>
+          <a:prstGeom prst="rect">
+            <a:avLst/>
+          </a:prstGeom>
+          <a:noFill/>
+        </p:spPr>
+        <p:txBody>
+          <a:bodyPr wrap="square" rtlCol="0">
+            <a:spAutoFit/>
+          </a:bodyPr>
+          <a:lstStyle/>
+          <a:p>
+            <a:r>
+              <a:rPr lang="de-DE" dirty="0"/>
+              <a:t>1</a:t>
+            </a:r>
+          </a:p>
+        </p:txBody>
+      </p:sp>
+    </p:spTree>
+    <p:extLst>
+      <p:ext uri="{BB962C8B-B14F-4D97-AF65-F5344CB8AC3E}">
+        <p14:creationId xmlns:p14="http://schemas.microsoft.com/office/powerpoint/2010/main" val="757215345"/>
+      </p:ext>
+    </p:extLst>
+  </p:cSld>
+  <p:clrMapOvr>
+    <a:masterClrMapping/>
+  </p:clrMapOvr>
+</p:sld>
+</file>
+
 <file path=ppt/theme/theme1.xml><?xml version="1.0" encoding="utf-8"?>
 <a:theme xmlns:a="http://schemas.openxmlformats.org/drawingml/2006/main" name="Office">
   <a:themeElements>

</xml_diff>